<commit_message>
movie seats selection - add screen and seat (html/css)
</commit_message>
<xml_diff>
--- a/img/좌석선택 mockup.pptx
+++ b/img/좌석선택 mockup.pptx
@@ -260,7 +260,7 @@
           <a:p>
             <a:fld id="{EAE1E1A4-80F8-4040-B7A9-542A0CAE387C}" type="datetimeFigureOut">
               <a:rPr lang="ko-KR" altLang="en-US" smtClean="0"/>
-              <a:t>2020-06-27</a:t>
+              <a:t>2020-06-28</a:t>
             </a:fld>
             <a:endParaRPr lang="ko-KR" altLang="en-US"/>
           </a:p>
@@ -458,7 +458,7 @@
           <a:p>
             <a:fld id="{EAE1E1A4-80F8-4040-B7A9-542A0CAE387C}" type="datetimeFigureOut">
               <a:rPr lang="ko-KR" altLang="en-US" smtClean="0"/>
-              <a:t>2020-06-27</a:t>
+              <a:t>2020-06-28</a:t>
             </a:fld>
             <a:endParaRPr lang="ko-KR" altLang="en-US"/>
           </a:p>
@@ -666,7 +666,7 @@
           <a:p>
             <a:fld id="{EAE1E1A4-80F8-4040-B7A9-542A0CAE387C}" type="datetimeFigureOut">
               <a:rPr lang="ko-KR" altLang="en-US" smtClean="0"/>
-              <a:t>2020-06-27</a:t>
+              <a:t>2020-06-28</a:t>
             </a:fld>
             <a:endParaRPr lang="ko-KR" altLang="en-US"/>
           </a:p>
@@ -864,7 +864,7 @@
           <a:p>
             <a:fld id="{EAE1E1A4-80F8-4040-B7A9-542A0CAE387C}" type="datetimeFigureOut">
               <a:rPr lang="ko-KR" altLang="en-US" smtClean="0"/>
-              <a:t>2020-06-27</a:t>
+              <a:t>2020-06-28</a:t>
             </a:fld>
             <a:endParaRPr lang="ko-KR" altLang="en-US"/>
           </a:p>
@@ -1139,7 +1139,7 @@
           <a:p>
             <a:fld id="{EAE1E1A4-80F8-4040-B7A9-542A0CAE387C}" type="datetimeFigureOut">
               <a:rPr lang="ko-KR" altLang="en-US" smtClean="0"/>
-              <a:t>2020-06-27</a:t>
+              <a:t>2020-06-28</a:t>
             </a:fld>
             <a:endParaRPr lang="ko-KR" altLang="en-US"/>
           </a:p>
@@ -1404,7 +1404,7 @@
           <a:p>
             <a:fld id="{EAE1E1A4-80F8-4040-B7A9-542A0CAE387C}" type="datetimeFigureOut">
               <a:rPr lang="ko-KR" altLang="en-US" smtClean="0"/>
-              <a:t>2020-06-27</a:t>
+              <a:t>2020-06-28</a:t>
             </a:fld>
             <a:endParaRPr lang="ko-KR" altLang="en-US"/>
           </a:p>
@@ -1816,7 +1816,7 @@
           <a:p>
             <a:fld id="{EAE1E1A4-80F8-4040-B7A9-542A0CAE387C}" type="datetimeFigureOut">
               <a:rPr lang="ko-KR" altLang="en-US" smtClean="0"/>
-              <a:t>2020-06-27</a:t>
+              <a:t>2020-06-28</a:t>
             </a:fld>
             <a:endParaRPr lang="ko-KR" altLang="en-US"/>
           </a:p>
@@ -1957,7 +1957,7 @@
           <a:p>
             <a:fld id="{EAE1E1A4-80F8-4040-B7A9-542A0CAE387C}" type="datetimeFigureOut">
               <a:rPr lang="ko-KR" altLang="en-US" smtClean="0"/>
-              <a:t>2020-06-27</a:t>
+              <a:t>2020-06-28</a:t>
             </a:fld>
             <a:endParaRPr lang="ko-KR" altLang="en-US"/>
           </a:p>
@@ -2070,7 +2070,7 @@
           <a:p>
             <a:fld id="{EAE1E1A4-80F8-4040-B7A9-542A0CAE387C}" type="datetimeFigureOut">
               <a:rPr lang="ko-KR" altLang="en-US" smtClean="0"/>
-              <a:t>2020-06-27</a:t>
+              <a:t>2020-06-28</a:t>
             </a:fld>
             <a:endParaRPr lang="ko-KR" altLang="en-US"/>
           </a:p>
@@ -2381,7 +2381,7 @@
           <a:p>
             <a:fld id="{EAE1E1A4-80F8-4040-B7A9-542A0CAE387C}" type="datetimeFigureOut">
               <a:rPr lang="ko-KR" altLang="en-US" smtClean="0"/>
-              <a:t>2020-06-27</a:t>
+              <a:t>2020-06-28</a:t>
             </a:fld>
             <a:endParaRPr lang="ko-KR" altLang="en-US"/>
           </a:p>
@@ -2669,7 +2669,7 @@
           <a:p>
             <a:fld id="{EAE1E1A4-80F8-4040-B7A9-542A0CAE387C}" type="datetimeFigureOut">
               <a:rPr lang="ko-KR" altLang="en-US" smtClean="0"/>
-              <a:t>2020-06-27</a:t>
+              <a:t>2020-06-28</a:t>
             </a:fld>
             <a:endParaRPr lang="ko-KR" altLang="en-US"/>
           </a:p>
@@ -2910,7 +2910,7 @@
           <a:p>
             <a:fld id="{EAE1E1A4-80F8-4040-B7A9-542A0CAE387C}" type="datetimeFigureOut">
               <a:rPr lang="ko-KR" altLang="en-US" smtClean="0"/>
-              <a:t>2020-06-27</a:t>
+              <a:t>2020-06-28</a:t>
             </a:fld>
             <a:endParaRPr lang="ko-KR" altLang="en-US"/>
           </a:p>
@@ -3379,6 +3379,58 @@
           </a:prstGeom>
           <a:solidFill>
             <a:srgbClr val="242333"/>
+          </a:solidFill>
+          <a:ln>
+            <a:noFill/>
+          </a:ln>
+        </p:spPr>
+        <p:style>
+          <a:lnRef idx="2">
+            <a:schemeClr val="accent1">
+              <a:shade val="50000"/>
+            </a:schemeClr>
+          </a:lnRef>
+          <a:fillRef idx="1">
+            <a:schemeClr val="accent1"/>
+          </a:fillRef>
+          <a:effectRef idx="0">
+            <a:schemeClr val="accent1"/>
+          </a:effectRef>
+          <a:fontRef idx="minor">
+            <a:schemeClr val="lt1"/>
+          </a:fontRef>
+        </p:style>
+        <p:txBody>
+          <a:bodyPr rtlCol="0" anchor="ctr"/>
+          <a:lstStyle/>
+          <a:p>
+            <a:pPr algn="ctr"/>
+            <a:endParaRPr lang="ko-KR" altLang="en-US"/>
+          </a:p>
+        </p:txBody>
+      </p:sp>
+      <p:sp>
+        <p:nvSpPr>
+          <p:cNvPr id="6" name="직사각형 5">
+            <a:extLst>
+              <a:ext uri="{FF2B5EF4-FFF2-40B4-BE49-F238E27FC236}">
+                <a16:creationId xmlns:a16="http://schemas.microsoft.com/office/drawing/2014/main" id="{0C98264E-F36E-4FBC-B2BD-B2AC6C3F00C2}"/>
+              </a:ext>
+            </a:extLst>
+          </p:cNvPr>
+          <p:cNvSpPr/>
+          <p:nvPr/>
+        </p:nvSpPr>
+        <p:spPr>
+          <a:xfrm>
+            <a:off x="9997440" y="3608832"/>
+            <a:ext cx="1670304" cy="938784"/>
+          </a:xfrm>
+          <a:prstGeom prst="rect">
+            <a:avLst/>
+          </a:prstGeom>
+          <a:solidFill>
+            <a:srgbClr val="444451"/>
           </a:solidFill>
           <a:ln>
             <a:noFill/>

</xml_diff>